<commit_message>
dfd little position changed
</commit_message>
<xml_diff>
--- a/code/arif/diagrams/SMMSDFD (1).pptx
+++ b/code/arif/diagrams/SMMSDFD (1).pptx
@@ -107,7 +107,7 @@
   </p:defaultTextStyle>
   <p:extLst>
     <p:ext uri="{EFAFB233-063F-42B5-8137-9DF3F51BA10A}">
-      <p15:sldGuideLst xmlns:p15="http://schemas.microsoft.com/office/powerpoint/2012/main">
+      <p15:sldGuideLst xmlns:p15="http://schemas.microsoft.com/office/powerpoint/2012/main" xmlns="">
         <p15:guide id="1" orient="horz" pos="2160">
           <p15:clr>
             <a:srgbClr val="A4A3A4"/>
@@ -308,7 +308,7 @@
     </p:spTree>
     <p:extLst>
       <p:ext uri="{BB962C8B-B14F-4D97-AF65-F5344CB8AC3E}">
-        <p14:creationId xmlns:p14="http://schemas.microsoft.com/office/powerpoint/2010/main" val="3909573272"/>
+        <p14:creationId xmlns:p14="http://schemas.microsoft.com/office/powerpoint/2010/main" xmlns="" val="3909573272"/>
       </p:ext>
     </p:extLst>
   </p:cSld>
@@ -480,7 +480,7 @@
     </p:spTree>
     <p:extLst>
       <p:ext uri="{BB962C8B-B14F-4D97-AF65-F5344CB8AC3E}">
-        <p14:creationId xmlns:p14="http://schemas.microsoft.com/office/powerpoint/2010/main" val="2411424216"/>
+        <p14:creationId xmlns:p14="http://schemas.microsoft.com/office/powerpoint/2010/main" xmlns="" val="2411424216"/>
       </p:ext>
     </p:extLst>
   </p:cSld>
@@ -662,7 +662,7 @@
     </p:spTree>
     <p:extLst>
       <p:ext uri="{BB962C8B-B14F-4D97-AF65-F5344CB8AC3E}">
-        <p14:creationId xmlns:p14="http://schemas.microsoft.com/office/powerpoint/2010/main" val="1035180329"/>
+        <p14:creationId xmlns:p14="http://schemas.microsoft.com/office/powerpoint/2010/main" xmlns="" val="1035180329"/>
       </p:ext>
     </p:extLst>
   </p:cSld>
@@ -834,7 +834,7 @@
     </p:spTree>
     <p:extLst>
       <p:ext uri="{BB962C8B-B14F-4D97-AF65-F5344CB8AC3E}">
-        <p14:creationId xmlns:p14="http://schemas.microsoft.com/office/powerpoint/2010/main" val="569637175"/>
+        <p14:creationId xmlns:p14="http://schemas.microsoft.com/office/powerpoint/2010/main" xmlns="" val="569637175"/>
       </p:ext>
     </p:extLst>
   </p:cSld>
@@ -1082,7 +1082,7 @@
     </p:spTree>
     <p:extLst>
       <p:ext uri="{BB962C8B-B14F-4D97-AF65-F5344CB8AC3E}">
-        <p14:creationId xmlns:p14="http://schemas.microsoft.com/office/powerpoint/2010/main" val="88948954"/>
+        <p14:creationId xmlns:p14="http://schemas.microsoft.com/office/powerpoint/2010/main" xmlns="" val="88948954"/>
       </p:ext>
     </p:extLst>
   </p:cSld>
@@ -1316,7 +1316,7 @@
     </p:spTree>
     <p:extLst>
       <p:ext uri="{BB962C8B-B14F-4D97-AF65-F5344CB8AC3E}">
-        <p14:creationId xmlns:p14="http://schemas.microsoft.com/office/powerpoint/2010/main" val="3843180464"/>
+        <p14:creationId xmlns:p14="http://schemas.microsoft.com/office/powerpoint/2010/main" xmlns="" val="3843180464"/>
       </p:ext>
     </p:extLst>
   </p:cSld>
@@ -1685,7 +1685,7 @@
     </p:spTree>
     <p:extLst>
       <p:ext uri="{BB962C8B-B14F-4D97-AF65-F5344CB8AC3E}">
-        <p14:creationId xmlns:p14="http://schemas.microsoft.com/office/powerpoint/2010/main" val="730252627"/>
+        <p14:creationId xmlns:p14="http://schemas.microsoft.com/office/powerpoint/2010/main" xmlns="" val="730252627"/>
       </p:ext>
     </p:extLst>
   </p:cSld>
@@ -1805,7 +1805,7 @@
     </p:spTree>
     <p:extLst>
       <p:ext uri="{BB962C8B-B14F-4D97-AF65-F5344CB8AC3E}">
-        <p14:creationId xmlns:p14="http://schemas.microsoft.com/office/powerpoint/2010/main" val="2352558110"/>
+        <p14:creationId xmlns:p14="http://schemas.microsoft.com/office/powerpoint/2010/main" xmlns="" val="2352558110"/>
       </p:ext>
     </p:extLst>
   </p:cSld>
@@ -1902,7 +1902,7 @@
     </p:spTree>
     <p:extLst>
       <p:ext uri="{BB962C8B-B14F-4D97-AF65-F5344CB8AC3E}">
-        <p14:creationId xmlns:p14="http://schemas.microsoft.com/office/powerpoint/2010/main" val="2974611636"/>
+        <p14:creationId xmlns:p14="http://schemas.microsoft.com/office/powerpoint/2010/main" xmlns="" val="2974611636"/>
       </p:ext>
     </p:extLst>
   </p:cSld>
@@ -2181,7 +2181,7 @@
     </p:spTree>
     <p:extLst>
       <p:ext uri="{BB962C8B-B14F-4D97-AF65-F5344CB8AC3E}">
-        <p14:creationId xmlns:p14="http://schemas.microsoft.com/office/powerpoint/2010/main" val="747845270"/>
+        <p14:creationId xmlns:p14="http://schemas.microsoft.com/office/powerpoint/2010/main" xmlns="" val="747845270"/>
       </p:ext>
     </p:extLst>
   </p:cSld>
@@ -2436,7 +2436,7 @@
     </p:spTree>
     <p:extLst>
       <p:ext uri="{BB962C8B-B14F-4D97-AF65-F5344CB8AC3E}">
-        <p14:creationId xmlns:p14="http://schemas.microsoft.com/office/powerpoint/2010/main" val="4127440860"/>
+        <p14:creationId xmlns:p14="http://schemas.microsoft.com/office/powerpoint/2010/main" xmlns="" val="4127440860"/>
       </p:ext>
     </p:extLst>
   </p:cSld>
@@ -2687,7 +2687,7 @@
     </p:spTree>
     <p:extLst>
       <p:ext uri="{BB962C8B-B14F-4D97-AF65-F5344CB8AC3E}">
-        <p14:creationId xmlns:p14="http://schemas.microsoft.com/office/powerpoint/2010/main" val="3176370633"/>
+        <p14:creationId xmlns:p14="http://schemas.microsoft.com/office/powerpoint/2010/main" xmlns="" val="3176370633"/>
       </p:ext>
     </p:extLst>
   </p:cSld>
@@ -3149,11 +3149,6 @@
                 </a:rPr>
                 <a:t>System</a:t>
               </a:r>
-              <a:endParaRPr lang="en-IN" dirty="0">
-                <a:solidFill>
-                  <a:schemeClr val="tx1"/>
-                </a:solidFill>
-              </a:endParaRPr>
             </a:p>
           </p:txBody>
         </p:sp>
@@ -3323,11 +3318,6 @@
                 </a:rPr>
                 <a:t>Review/Rating</a:t>
               </a:r>
-              <a:endParaRPr lang="en-IN" dirty="0">
-                <a:solidFill>
-                  <a:schemeClr val="tx1"/>
-                </a:solidFill>
-              </a:endParaRPr>
             </a:p>
           </p:txBody>
         </p:sp>
@@ -4289,11 +4279,7 @@
             <a:p>
               <a:r>
                 <a:rPr lang="en-US" dirty="0" smtClean="0"/>
-                <a:t>review</a:t>
-              </a:r>
-              <a:r>
-                <a:rPr lang="en-US" dirty="0" smtClean="0"/>
-                <a:t>/</a:t>
+                <a:t>review/</a:t>
               </a:r>
             </a:p>
             <a:p>
@@ -8393,7 +8379,7 @@
         </p:nvSpPr>
         <p:spPr>
           <a:xfrm>
-            <a:off x="8214134" y="5324817"/>
+            <a:off x="8153400" y="5324817"/>
             <a:ext cx="929866" cy="390183"/>
           </a:xfrm>
           <a:prstGeom prst="rect">
@@ -8438,8 +8424,8 @@
         </p:nvCxnSpPr>
         <p:spPr>
           <a:xfrm rot="5400000">
-            <a:off x="8284676" y="5906781"/>
-            <a:ext cx="586172" cy="202611"/>
+            <a:off x="8254309" y="5937148"/>
+            <a:ext cx="586172" cy="141877"/>
           </a:xfrm>
           <a:prstGeom prst="bentConnector2">
             <a:avLst/>
@@ -8504,13 +8490,13 @@
         </p:nvCxnSpPr>
         <p:spPr>
           <a:xfrm rot="5400000" flipH="1" flipV="1">
-            <a:off x="7717767" y="4185129"/>
-            <a:ext cx="2100989" cy="178389"/>
+            <a:off x="7687400" y="4154762"/>
+            <a:ext cx="2100989" cy="239123"/>
           </a:xfrm>
           <a:prstGeom prst="bentConnector4">
             <a:avLst>
               <a:gd name="adj1" fmla="val 44002"/>
-              <a:gd name="adj2" fmla="val 228147"/>
+              <a:gd name="adj2" fmla="val 195599"/>
             </a:avLst>
           </a:prstGeom>
           <a:ln>
@@ -8613,7 +8599,7 @@
     </a:clrScheme>
     <a:fontScheme name="Office">
       <a:majorFont>
-        <a:latin typeface="Calibri Light" panose="020F0302020204030204"/>
+        <a:latin typeface="Calibri Light"/>
         <a:ea typeface=""/>
         <a:cs typeface=""/>
         <a:font script="Jpan" typeface="ＭＳ Ｐゴシック"/>
@@ -8648,7 +8634,7 @@
         <a:font script="Geor" typeface="Sylfaen"/>
       </a:majorFont>
       <a:minorFont>
-        <a:latin typeface="Calibri" panose="020F0502020204030204"/>
+        <a:latin typeface="Calibri"/>
         <a:ea typeface=""/>
         <a:cs typeface=""/>
         <a:font script="Jpan" typeface="ＭＳ Ｐゴシック"/>
@@ -8825,7 +8811,7 @@
   <a:extraClrSchemeLst/>
   <a:extLst>
     <a:ext uri="{05A4C25C-085E-4340-85A3-A5531E510DB2}">
-      <thm15:themeFamily xmlns:thm15="http://schemas.microsoft.com/office/thememl/2012/main" name="Office Theme" id="{62F939B6-93AF-4DB8-9C6B-D6C7DFDC589F}" vid="{4A3C46E8-61CC-4603-A589-7422A47A8E4A}"/>
+      <thm15:themeFamily xmlns:thm15="http://schemas.microsoft.com/office/thememl/2012/main" xmlns="" name="Office Theme" id="{62F939B6-93AF-4DB8-9C6B-D6C7DFDC589F}" vid="{4A3C46E8-61CC-4603-A589-7422A47A8E4A}"/>
     </a:ext>
   </a:extLst>
 </a:theme>

</xml_diff>